<commit_message>
English contents are added.
</commit_message>
<xml_diff>
--- a/images/FFig.pptx
+++ b/images/FFig.pptx
@@ -5,7 +5,8 @@
     <p:sldMasterId id="2147483648" r:id="rId1"/>
   </p:sldMasterIdLst>
   <p:sldIdLst>
-    <p:sldId id="256" r:id="rId2"/>
+    <p:sldId id="257" r:id="rId2"/>
+    <p:sldId id="256" r:id="rId3"/>
   </p:sldIdLst>
   <p:sldSz cx="12192000" cy="6858000"/>
   <p:notesSz cx="6858000" cy="9144000"/>
@@ -3342,6 +3343,124 @@
           <a:chExt cx="0" cy="0"/>
         </a:xfrm>
       </p:grpSpPr>
+      <p:pic>
+        <p:nvPicPr>
+          <p:cNvPr id="11" name="Picture 10" descr="A picture containing outdoor&#10;&#10;Description automatically generated">
+            <a:extLst>
+              <a:ext uri="{FF2B5EF4-FFF2-40B4-BE49-F238E27FC236}">
+                <a16:creationId xmlns:a16="http://schemas.microsoft.com/office/drawing/2014/main" id="{16572698-8473-2144-A3B7-B80330A8B513}"/>
+              </a:ext>
+            </a:extLst>
+          </p:cNvPr>
+          <p:cNvPicPr>
+            <a:picLocks noChangeAspect="1"/>
+          </p:cNvPicPr>
+          <p:nvPr/>
+        </p:nvPicPr>
+        <p:blipFill rotWithShape="1">
+          <a:blip r:embed="rId2"/>
+          <a:srcRect t="1" b="19595"/>
+          <a:stretch/>
+        </p:blipFill>
+        <p:spPr>
+          <a:xfrm>
+            <a:off x="0" y="198526"/>
+            <a:ext cx="12192000" cy="5194884"/>
+          </a:xfrm>
+          <a:prstGeom prst="rect">
+            <a:avLst/>
+          </a:prstGeom>
+        </p:spPr>
+      </p:pic>
+      <p:pic>
+        <p:nvPicPr>
+          <p:cNvPr id="9" name="Picture 8" descr="A picture containing text, sign&#10;&#10;Description automatically generated">
+            <a:extLst>
+              <a:ext uri="{FF2B5EF4-FFF2-40B4-BE49-F238E27FC236}">
+                <a16:creationId xmlns:a16="http://schemas.microsoft.com/office/drawing/2014/main" id="{625B24D6-535C-CE44-AD48-B657ACE3FBDA}"/>
+              </a:ext>
+            </a:extLst>
+          </p:cNvPr>
+          <p:cNvPicPr>
+            <a:picLocks noChangeAspect="1"/>
+          </p:cNvPicPr>
+          <p:nvPr/>
+        </p:nvPicPr>
+        <p:blipFill>
+          <a:blip r:embed="rId3"/>
+          <a:stretch>
+            <a:fillRect/>
+          </a:stretch>
+        </p:blipFill>
+        <p:spPr>
+          <a:xfrm>
+            <a:off x="10047875" y="2950951"/>
+            <a:ext cx="1927149" cy="2232219"/>
+          </a:xfrm>
+          <a:prstGeom prst="rect">
+            <a:avLst/>
+          </a:prstGeom>
+        </p:spPr>
+      </p:pic>
+    </p:spTree>
+    <p:extLst>
+      <p:ext uri="{BB962C8B-B14F-4D97-AF65-F5344CB8AC3E}">
+        <p14:creationId xmlns:p14="http://schemas.microsoft.com/office/powerpoint/2010/main" val="223300550"/>
+      </p:ext>
+    </p:extLst>
+  </p:cSld>
+  <p:clrMapOvr>
+    <a:masterClrMapping/>
+  </p:clrMapOvr>
+</p:sld>
+</file>
+
+<file path=ppt/slides/slide2.xml><?xml version="1.0" encoding="utf-8"?>
+<p:sld xmlns:a="http://schemas.openxmlformats.org/drawingml/2006/main" xmlns:r="http://schemas.openxmlformats.org/officeDocument/2006/relationships" xmlns:p="http://schemas.openxmlformats.org/presentationml/2006/main">
+  <p:cSld>
+    <p:spTree>
+      <p:nvGrpSpPr>
+        <p:cNvPr id="1" name=""/>
+        <p:cNvGrpSpPr/>
+        <p:nvPr/>
+      </p:nvGrpSpPr>
+      <p:grpSpPr>
+        <a:xfrm>
+          <a:off x="0" y="0"/>
+          <a:ext cx="0" cy="0"/>
+          <a:chOff x="0" y="0"/>
+          <a:chExt cx="0" cy="0"/>
+        </a:xfrm>
+      </p:grpSpPr>
+      <p:pic>
+        <p:nvPicPr>
+          <p:cNvPr id="38" name="Picture 37" descr="A picture containing silhouette&#10;&#10;Description automatically generated">
+            <a:extLst>
+              <a:ext uri="{FF2B5EF4-FFF2-40B4-BE49-F238E27FC236}">
+                <a16:creationId xmlns:a16="http://schemas.microsoft.com/office/drawing/2014/main" id="{1D250ECD-8E29-C941-B41C-E25D99DA32AB}"/>
+              </a:ext>
+            </a:extLst>
+          </p:cNvPr>
+          <p:cNvPicPr>
+            <a:picLocks noChangeAspect="1"/>
+          </p:cNvPicPr>
+          <p:nvPr/>
+        </p:nvPicPr>
+        <p:blipFill rotWithShape="1">
+          <a:blip r:embed="rId2"/>
+          <a:srcRect l="12923" t="11742" r="12435" b="11235"/>
+          <a:stretch/>
+        </p:blipFill>
+        <p:spPr>
+          <a:xfrm>
+            <a:off x="0" y="2360049"/>
+            <a:ext cx="2112490" cy="2179895"/>
+          </a:xfrm>
+          <a:prstGeom prst="rect">
+            <a:avLst/>
+          </a:prstGeom>
+        </p:spPr>
+      </p:pic>
       <p:sp>
         <p:nvSpPr>
           <p:cNvPr id="4" name="Rectangle 3">
@@ -3356,7 +3475,7 @@
         </p:nvSpPr>
         <p:spPr>
           <a:xfrm>
-            <a:off x="3779798" y="2157846"/>
+            <a:off x="4291242" y="2002865"/>
             <a:ext cx="1839913" cy="641527"/>
           </a:xfrm>
           <a:prstGeom prst="rect">
@@ -3392,14 +3511,14 @@
               </a:lnSpc>
             </a:pPr>
             <a:r>
-              <a:rPr lang="en-US" altLang="ja-JP" sz="1800" dirty="0">
+              <a:rPr lang="en-US" altLang="ja-JP" dirty="0">
                 <a:solidFill>
                   <a:schemeClr val="bg1"/>
                 </a:solidFill>
               </a:rPr>
               <a:t>Spatial data collection</a:t>
             </a:r>
-            <a:endParaRPr lang="en-US" sz="1800" dirty="0">
+            <a:endParaRPr lang="en-US" dirty="0">
               <a:solidFill>
                 <a:schemeClr val="bg1"/>
               </a:solidFill>
@@ -3421,7 +3540,7 @@
         </p:nvSpPr>
         <p:spPr>
           <a:xfrm>
-            <a:off x="5759894" y="2155752"/>
+            <a:off x="6271338" y="2000771"/>
             <a:ext cx="1851689" cy="641527"/>
           </a:xfrm>
           <a:prstGeom prst="rect">
@@ -3457,14 +3576,14 @@
               </a:lnSpc>
             </a:pPr>
             <a:r>
-              <a:rPr lang="en-US" altLang="ja-JP" sz="1800" dirty="0">
+              <a:rPr lang="en-US" altLang="ja-JP" dirty="0">
                 <a:solidFill>
                   <a:schemeClr val="bg1"/>
                 </a:solidFill>
               </a:rPr>
               <a:t>Spatial data processing</a:t>
             </a:r>
-            <a:endParaRPr lang="en-US" sz="1800" dirty="0">
+            <a:endParaRPr lang="en-US" dirty="0">
               <a:solidFill>
                 <a:schemeClr val="bg1"/>
               </a:solidFill>
@@ -3486,8 +3605,8 @@
         </p:nvSpPr>
         <p:spPr>
           <a:xfrm>
-            <a:off x="5693211" y="1206243"/>
-            <a:ext cx="1948649" cy="604007"/>
+            <a:off x="6044342" y="1051262"/>
+            <a:ext cx="2170954" cy="604007"/>
           </a:xfrm>
           <a:prstGeom prst="rect">
             <a:avLst/>
@@ -3522,7 +3641,7 @@
               </a:lnSpc>
             </a:pPr>
             <a:r>
-              <a:rPr lang="en-US" altLang="ja-JP" sz="1800" dirty="0">
+              <a:rPr lang="en-US" altLang="ja-JP" dirty="0">
                 <a:solidFill>
                   <a:schemeClr val="bg1"/>
                 </a:solidFill>
@@ -3530,7 +3649,7 @@
               <a:t>Explanatory spatial </a:t>
             </a:r>
             <a:r>
-              <a:rPr lang="ja-JP" altLang="en-US" sz="1800">
+              <a:rPr lang="ja-JP" altLang="en-US">
                 <a:solidFill>
                   <a:schemeClr val="bg1"/>
                 </a:solidFill>
@@ -3538,14 +3657,14 @@
               <a:t>　　　</a:t>
             </a:r>
             <a:r>
-              <a:rPr lang="en-US" altLang="ja-JP" sz="1800" dirty="0">
+              <a:rPr lang="en-US" altLang="ja-JP" dirty="0">
                 <a:solidFill>
                   <a:schemeClr val="bg1"/>
                 </a:solidFill>
               </a:rPr>
               <a:t>data analysis</a:t>
             </a:r>
-            <a:endParaRPr lang="en-US" sz="1800" dirty="0">
+            <a:endParaRPr lang="en-US" dirty="0">
               <a:solidFill>
                 <a:schemeClr val="bg1"/>
               </a:solidFill>
@@ -3603,14 +3722,14 @@
               </a:lnSpc>
             </a:pPr>
             <a:r>
-              <a:rPr lang="en-US" altLang="ja-JP" sz="1800" dirty="0">
+              <a:rPr lang="en-US" altLang="ja-JP" dirty="0">
                 <a:solidFill>
                   <a:schemeClr val="bg1"/>
                 </a:solidFill>
               </a:rPr>
               <a:t>Spatial analysis / modeling</a:t>
             </a:r>
-            <a:endParaRPr lang="en-US" sz="1800" dirty="0">
+            <a:endParaRPr lang="en-US" dirty="0">
               <a:solidFill>
                 <a:schemeClr val="bg1"/>
               </a:solidFill>
@@ -3668,14 +3787,14 @@
               </a:lnSpc>
             </a:pPr>
             <a:r>
-              <a:rPr lang="en-US" altLang="ja-JP" sz="1800" dirty="0">
+              <a:rPr lang="en-US" altLang="ja-JP" dirty="0">
                 <a:solidFill>
                   <a:schemeClr val="bg1"/>
                 </a:solidFill>
               </a:rPr>
               <a:t>Mapping</a:t>
             </a:r>
-            <a:endParaRPr lang="en-US" sz="1800" dirty="0">
+            <a:endParaRPr lang="en-US" dirty="0">
               <a:solidFill>
                 <a:schemeClr val="bg1"/>
               </a:solidFill>
@@ -3683,42 +3802,6 @@
           </a:p>
         </p:txBody>
       </p:sp>
-      <p:pic>
-        <p:nvPicPr>
-          <p:cNvPr id="9" name="Picture 8">
-            <a:extLst>
-              <a:ext uri="{FF2B5EF4-FFF2-40B4-BE49-F238E27FC236}">
-                <a16:creationId xmlns:a16="http://schemas.microsoft.com/office/drawing/2014/main" id="{270D4890-7388-3E48-9E24-BA7F101CA477}"/>
-              </a:ext>
-            </a:extLst>
-          </p:cNvPr>
-          <p:cNvPicPr>
-            <a:picLocks noChangeAspect="1"/>
-          </p:cNvPicPr>
-          <p:nvPr/>
-        </p:nvPicPr>
-        <p:blipFill>
-          <a:blip r:embed="rId2" cstate="print">
-            <a:extLst>
-              <a:ext uri="{28A0092B-C50C-407E-A947-70E740481C1C}">
-                <a14:useLocalDpi xmlns:a14="http://schemas.microsoft.com/office/drawing/2010/main"/>
-              </a:ext>
-            </a:extLst>
-          </a:blip>
-          <a:stretch>
-            <a:fillRect/>
-          </a:stretch>
-        </p:blipFill>
-        <p:spPr>
-          <a:xfrm>
-            <a:off x="195651" y="2783825"/>
-            <a:ext cx="1761421" cy="1761421"/>
-          </a:xfrm>
-          <a:prstGeom prst="rect">
-            <a:avLst/>
-          </a:prstGeom>
-        </p:spPr>
-      </p:pic>
       <p:cxnSp>
         <p:nvCxnSpPr>
           <p:cNvPr id="10" name="Curved Connector 9">
@@ -3730,15 +3813,14 @@
           </p:cNvPr>
           <p:cNvCxnSpPr>
             <a:cxnSpLocks/>
-            <a:stCxn id="9" idx="0"/>
             <a:endCxn id="21" idx="1"/>
           </p:cNvCxnSpPr>
           <p:nvPr/>
         </p:nvCxnSpPr>
         <p:spPr>
           <a:xfrm rot="5400000" flipH="1" flipV="1">
-            <a:off x="1255087" y="2297684"/>
-            <a:ext cx="307416" cy="664867"/>
+            <a:off x="1599322" y="1805360"/>
+            <a:ext cx="137282" cy="1169419"/>
           </a:xfrm>
           <a:prstGeom prst="curvedConnector2">
             <a:avLst/>
@@ -3783,7 +3865,7 @@
         </p:nvCxnSpPr>
         <p:spPr>
           <a:xfrm flipV="1">
-            <a:off x="5619711" y="2476516"/>
+            <a:off x="6131155" y="2321535"/>
             <a:ext cx="140183" cy="2094"/>
           </a:xfrm>
           <a:prstGeom prst="curvedConnector3">
@@ -3831,12 +3913,12 @@
         </p:nvCxnSpPr>
         <p:spPr>
           <a:xfrm flipH="1">
-            <a:off x="7592678" y="2476516"/>
-            <a:ext cx="18905" cy="2543899"/>
+            <a:off x="7592678" y="2321535"/>
+            <a:ext cx="530349" cy="2698880"/>
           </a:xfrm>
           <a:prstGeom prst="curvedConnector3">
             <a:avLst>
-              <a:gd name="adj1" fmla="val -2717937"/>
+              <a:gd name="adj1" fmla="val -78172"/>
             </a:avLst>
           </a:prstGeom>
           <a:ln w="38100">
@@ -3970,7 +4052,7 @@
         </p:nvCxnSpPr>
         <p:spPr>
           <a:xfrm rot="5400000" flipH="1" flipV="1">
-            <a:off x="6396731" y="1954501"/>
+            <a:off x="6908175" y="1799520"/>
             <a:ext cx="270000" cy="0"/>
           </a:xfrm>
           <a:prstGeom prst="curvedConnector3">
@@ -4016,7 +4098,7 @@
         </p:nvCxnSpPr>
         <p:spPr>
           <a:xfrm rot="5400000">
-            <a:off x="6770472" y="1970460"/>
+            <a:off x="7281916" y="1815479"/>
             <a:ext cx="272897" cy="1"/>
           </a:xfrm>
           <a:prstGeom prst="curvedConnector3">
@@ -4152,8 +4234,8 @@
         </p:nvSpPr>
         <p:spPr>
           <a:xfrm>
-            <a:off x="816976" y="3555745"/>
-            <a:ext cx="1067215" cy="483081"/>
+            <a:off x="1123959" y="3140836"/>
+            <a:ext cx="978859" cy="477054"/>
           </a:xfrm>
           <a:prstGeom prst="rect">
             <a:avLst/>
@@ -4171,7 +4253,7 @@
               </a:lnSpc>
             </a:pPr>
             <a:r>
-              <a:rPr lang="en-US" altLang="ja-JP" sz="1600" dirty="0">
+              <a:rPr lang="en-US" altLang="ja-JP" sz="1400" b="1" dirty="0">
                 <a:solidFill>
                   <a:schemeClr val="bg1"/>
                 </a:solidFill>
@@ -4186,14 +4268,14 @@
               </a:lnSpc>
             </a:pPr>
             <a:r>
-              <a:rPr lang="en-US" altLang="ja-JP" sz="1600" dirty="0">
+              <a:rPr lang="en-US" altLang="ja-JP" sz="1400" b="1" dirty="0">
                 <a:solidFill>
                   <a:schemeClr val="bg1"/>
                 </a:solidFill>
               </a:rPr>
               <a:t>Real world</a:t>
             </a:r>
-            <a:endParaRPr lang="en-US" sz="1600" dirty="0">
+            <a:endParaRPr lang="en-US" sz="1400" b="1" dirty="0">
               <a:solidFill>
                 <a:schemeClr val="bg1"/>
               </a:solidFill>
@@ -4251,7 +4333,7 @@
         </p:nvSpPr>
         <p:spPr>
           <a:xfrm>
-            <a:off x="1741229" y="2155645"/>
+            <a:off x="2252673" y="2000664"/>
             <a:ext cx="1911066" cy="641527"/>
           </a:xfrm>
           <a:prstGeom prst="rect">
@@ -4287,14 +4369,14 @@
               </a:lnSpc>
             </a:pPr>
             <a:r>
-              <a:rPr lang="en-US" altLang="ja-JP" sz="1800" dirty="0">
+              <a:rPr lang="en-US" altLang="ja-JP" dirty="0">
                 <a:solidFill>
                   <a:schemeClr val="bg1"/>
                 </a:solidFill>
               </a:rPr>
               <a:t>observation</a:t>
             </a:r>
-            <a:endParaRPr lang="en-US" sz="1800" dirty="0">
+            <a:endParaRPr lang="en-US" dirty="0">
               <a:solidFill>
                 <a:schemeClr val="bg1"/>
               </a:solidFill>
@@ -4320,7 +4402,7 @@
         </p:nvCxnSpPr>
         <p:spPr>
           <a:xfrm>
-            <a:off x="3652295" y="2476409"/>
+            <a:off x="4163739" y="2321428"/>
             <a:ext cx="127503" cy="2201"/>
           </a:xfrm>
           <a:prstGeom prst="curvedConnector3">
@@ -4400,14 +4482,14 @@
               </a:lnSpc>
             </a:pPr>
             <a:r>
-              <a:rPr lang="en-US" altLang="ja-JP" sz="1800" dirty="0">
+              <a:rPr lang="en-US" altLang="ja-JP" dirty="0">
                 <a:solidFill>
                   <a:schemeClr val="bg1"/>
                 </a:solidFill>
               </a:rPr>
               <a:t>Evaluation</a:t>
             </a:r>
-            <a:endParaRPr lang="en-US" sz="1800" dirty="0">
+            <a:endParaRPr lang="en-US" dirty="0">
               <a:solidFill>
                 <a:schemeClr val="bg1"/>
               </a:solidFill>

</xml_diff>